<commit_message>
lab 4 and project
</commit_message>
<xml_diff>
--- a/Project/Documentation/IOT-SMART-HOME-Firebot-and-Device-Automation.pptx
+++ b/Project/Documentation/IOT-SMART-HOME-Firebot-and-Device-Automation.pptx
@@ -2068,8 +2068,8 @@
     <dgm:cxn modelId="{B234560F-DCC6-4C2B-912B-3AFC20390007}" srcId="{79550698-E5E1-4236-826F-FC9843C59BE4}" destId="{EDAFAEAD-A953-40D9-8EFB-CB21DD1C3618}" srcOrd="0" destOrd="0" parTransId="{29A47A24-2C5C-4BC0-8F3A-A67CFDA6A61D}" sibTransId="{F98CF3DA-0F5B-4E56-B493-EBFAA66FF6AC}"/>
     <dgm:cxn modelId="{8BD0589E-D5C9-4A16-86DE-F48026016930}" type="presOf" srcId="{57B71C3F-0CBD-4B9C-B399-7815E2252CFE}" destId="{957174C0-641B-486C-981C-D3D50D796F87}" srcOrd="0" destOrd="0" presId="urn:microsoft.com/office/officeart/2005/8/layout/process5"/>
     <dgm:cxn modelId="{8758221A-91F1-42E7-AFE9-1F78EED6F09D}" type="presOf" srcId="{9DF9B6C0-9ADB-4F96-9762-79685057A34B}" destId="{FEF8AE67-254E-4138-9C61-EDD3879FCBF5}" srcOrd="0" destOrd="0" presId="urn:microsoft.com/office/officeart/2005/8/layout/process5"/>
+    <dgm:cxn modelId="{13CB620E-406C-4FCC-B1A5-8095C355F526}" type="presOf" srcId="{FF01715B-F40D-4183-9A9F-0AF17A3F9929}" destId="{B4D1E3F1-9ABF-4904-83A9-AAB8A5CE19B5}" srcOrd="0" destOrd="0" presId="urn:microsoft.com/office/officeart/2005/8/layout/process5"/>
     <dgm:cxn modelId="{BDD5BD61-9FE4-462B-BC86-B9D0EBEBC6EB}" type="presOf" srcId="{E75C62E8-C86E-4DDF-98BB-95E2925BC518}" destId="{29E92719-BAF7-4D77-A3C3-AADB5F9AD43A}" srcOrd="0" destOrd="0" presId="urn:microsoft.com/office/officeart/2005/8/layout/process5"/>
-    <dgm:cxn modelId="{13CB620E-406C-4FCC-B1A5-8095C355F526}" type="presOf" srcId="{FF01715B-F40D-4183-9A9F-0AF17A3F9929}" destId="{B4D1E3F1-9ABF-4904-83A9-AAB8A5CE19B5}" srcOrd="0" destOrd="0" presId="urn:microsoft.com/office/officeart/2005/8/layout/process5"/>
     <dgm:cxn modelId="{F776759B-773D-4B3D-8EA2-171F83E6DC14}" type="presOf" srcId="{F98CF3DA-0F5B-4E56-B493-EBFAA66FF6AC}" destId="{78A3DC04-3497-4902-AF98-68282BC6C03A}" srcOrd="0" destOrd="0" presId="urn:microsoft.com/office/officeart/2005/8/layout/process5"/>
     <dgm:cxn modelId="{0E5FDC8B-25CF-41DD-B372-6E0D69B82892}" srcId="{79550698-E5E1-4236-826F-FC9843C59BE4}" destId="{DA1B01F4-8B0B-43C5-A4C6-F4619D499AEE}" srcOrd="2" destOrd="0" parTransId="{5F2B4C44-9ED6-4637-A567-DEF526A66C58}" sibTransId="{D935C3DF-04A6-4603-94DA-B3E8CE33C220}"/>
     <dgm:cxn modelId="{46176A04-9B83-4031-8A19-AFFC0BA6B225}" srcId="{79550698-E5E1-4236-826F-FC9843C59BE4}" destId="{E75C62E8-C86E-4DDF-98BB-95E2925BC518}" srcOrd="3" destOrd="0" parTransId="{4DAD7412-04B0-4A89-A94F-08022B0E7BF4}" sibTransId="{5119C2EA-ED5B-4414-9879-EDC73AA366F9}"/>
@@ -13590,7 +13590,7 @@
           </p:cNvPicPr>
           <p:nvPr/>
         </p:nvPicPr>
-        <p:blipFill>
+        <p:blipFill rotWithShape="1">
           <a:blip r:embed="rId2">
             <a:extLst>
               <a:ext uri="{28A0092B-C50C-407E-A947-70E740481C1C}">
@@ -13598,14 +13598,13 @@
               </a:ext>
             </a:extLst>
           </a:blip>
-          <a:stretch>
-            <a:fillRect/>
-          </a:stretch>
+          <a:srcRect b="10815"/>
+          <a:stretch/>
         </p:blipFill>
         <p:spPr>
           <a:xfrm>
-            <a:off x="6276995" y="1417625"/>
-            <a:ext cx="4011848" cy="2841578"/>
+            <a:off x="5501932" y="1528331"/>
+            <a:ext cx="4011848" cy="2534253"/>
           </a:xfrm>
           <a:prstGeom prst="rect">
             <a:avLst/>
@@ -13790,7 +13789,7 @@
         </p:blipFill>
         <p:spPr>
           <a:xfrm>
-            <a:off x="1260062" y="1539195"/>
+            <a:off x="397913" y="1561671"/>
             <a:ext cx="4770261" cy="2500913"/>
           </a:xfrm>
           <a:prstGeom prst="rect">
@@ -13852,6 +13851,36 @@
           <a:xfrm>
             <a:off x="10801350" y="266523"/>
             <a:ext cx="1246363" cy="550303"/>
+          </a:xfrm>
+          <a:prstGeom prst="rect">
+            <a:avLst/>
+          </a:prstGeom>
+        </p:spPr>
+      </p:pic>
+      <p:pic>
+        <p:nvPicPr>
+          <p:cNvPr id="4" name="Picture 3"/>
+          <p:cNvPicPr>
+            <a:picLocks noChangeAspect="1"/>
+          </p:cNvPicPr>
+          <p:nvPr/>
+        </p:nvPicPr>
+        <p:blipFill>
+          <a:blip r:embed="rId5" cstate="hqprint">
+            <a:extLst>
+              <a:ext uri="{28A0092B-C50C-407E-A947-70E740481C1C}">
+                <a14:useLocalDpi xmlns:a14="http://schemas.microsoft.com/office/drawing/2010/main" val="0"/>
+              </a:ext>
+            </a:extLst>
+          </a:blip>
+          <a:stretch>
+            <a:fillRect/>
+          </a:stretch>
+        </p:blipFill>
+        <p:spPr>
+          <a:xfrm>
+            <a:off x="9846423" y="1271813"/>
+            <a:ext cx="1824098" cy="3119472"/>
           </a:xfrm>
           <a:prstGeom prst="rect">
             <a:avLst/>
@@ -13946,7 +13975,7 @@
         </p:spPr>
         <p:txBody>
           <a:bodyPr>
-            <a:normAutofit/>
+            <a:normAutofit fontScale="92500"/>
           </a:bodyPr>
           <a:lstStyle/>
           <a:p>
@@ -14014,8 +14043,23 @@
             </a:pPr>
             <a:r>
               <a:rPr lang="en-US" sz="2400" dirty="0"/>
-              <a:t>Controlling the AC, fans, lights in a MIT app inventor android application.</a:t>
+              <a:t>Controlling the AC, fans, lights in a MIT app inventor android application</a:t>
             </a:r>
+            <a:r>
+              <a:rPr lang="en-US" sz="2400" dirty="0" smtClean="0"/>
+              <a:t>.</a:t>
+            </a:r>
+          </a:p>
+          <a:p>
+            <a:pPr>
+              <a:buFont typeface="Wingdings" panose="05000000000000000000" pitchFamily="2" charset="2"/>
+              <a:buChar char="Ø"/>
+            </a:pPr>
+            <a:r>
+              <a:rPr lang="en-US" dirty="0"/>
+              <a:t>Using a NAO robot which can say the weather condition at home and also can describe the fire situation if there is any.</a:t>
+            </a:r>
+            <a:endParaRPr lang="en-US" sz="2400" dirty="0"/>
           </a:p>
           <a:p>
             <a:pPr>

</xml_diff>